<commit_message>
Actualizacion documentacion y carpetas
#30 burndown chart
#29
</commit_message>
<xml_diff>
--- a/Documentacion/2. Planeación/3. Release planning.pptx
+++ b/Documentacion/2. Planeación/3. Release planning.pptx
@@ -303,7 +303,7 @@
                 </a:solidFill>
               </a:rPr>
               <a:pPr/>
-              <a:t>14/03/2018</a:t>
+              <a:t>06/04/2018</a:t>
             </a:fld>
             <a:endParaRPr lang="es-ES">
               <a:solidFill>
@@ -611,7 +611,7 @@
                 </a:solidFill>
               </a:rPr>
               <a:pPr/>
-              <a:t>14/03/2018</a:t>
+              <a:t>06/04/2018</a:t>
             </a:fld>
             <a:endParaRPr lang="es-ES">
               <a:solidFill>
@@ -929,7 +929,7 @@
                 </a:solidFill>
               </a:rPr>
               <a:pPr/>
-              <a:t>14/03/2018</a:t>
+              <a:t>06/04/2018</a:t>
             </a:fld>
             <a:endParaRPr lang="es-ES">
               <a:solidFill>
@@ -1838,7 +1838,7 @@
                 </a:solidFill>
               </a:rPr>
               <a:pPr/>
-              <a:t>14/03/2018</a:t>
+              <a:t>06/04/2018</a:t>
             </a:fld>
             <a:endParaRPr lang="es-ES">
               <a:solidFill>
@@ -2223,7 +2223,7 @@
                 </a:solidFill>
               </a:rPr>
               <a:pPr/>
-              <a:t>14/03/2018</a:t>
+              <a:t>06/04/2018</a:t>
             </a:fld>
             <a:endParaRPr lang="es-ES">
               <a:solidFill>
@@ -2648,7 +2648,7 @@
                 </a:solidFill>
               </a:rPr>
               <a:pPr/>
-              <a:t>14/03/2018</a:t>
+              <a:t>06/04/2018</a:t>
             </a:fld>
             <a:endParaRPr lang="es-ES">
               <a:solidFill>
@@ -3207,7 +3207,7 @@
                 </a:solidFill>
               </a:rPr>
               <a:pPr/>
-              <a:t>14/03/2018</a:t>
+              <a:t>06/04/2018</a:t>
             </a:fld>
             <a:endParaRPr lang="es-ES">
               <a:solidFill>
@@ -3464,7 +3464,7 @@
                 </a:solidFill>
               </a:rPr>
               <a:pPr/>
-              <a:t>14/03/2018</a:t>
+              <a:t>06/04/2018</a:t>
             </a:fld>
             <a:endParaRPr lang="es-ES">
               <a:solidFill>
@@ -3699,7 +3699,7 @@
                 </a:solidFill>
               </a:rPr>
               <a:pPr/>
-              <a:t>14/03/2018</a:t>
+              <a:t>06/04/2018</a:t>
             </a:fld>
             <a:endParaRPr lang="es-ES">
               <a:solidFill>
@@ -4006,7 +4006,7 @@
                 </a:solidFill>
               </a:rPr>
               <a:pPr/>
-              <a:t>14/03/2018</a:t>
+              <a:t>06/04/2018</a:t>
             </a:fld>
             <a:endParaRPr lang="es-ES">
               <a:solidFill>
@@ -4398,7 +4398,7 @@
                 </a:solidFill>
               </a:rPr>
               <a:pPr/>
-              <a:t>14/03/2018</a:t>
+              <a:t>06/04/2018</a:t>
             </a:fld>
             <a:endParaRPr lang="es-ES">
               <a:solidFill>
@@ -4757,7 +4757,7 @@
                 </a:solidFill>
               </a:rPr>
               <a:pPr/>
-              <a:t>14/03/2018</a:t>
+              <a:t>06/04/2018</a:t>
             </a:fld>
             <a:endParaRPr lang="es-ES">
               <a:solidFill>
@@ -7598,7 +7598,7 @@
         </p:nvSpPr>
         <p:spPr>
           <a:xfrm>
-            <a:off x="9142470" y="1257940"/>
+            <a:off x="9334565" y="1448438"/>
             <a:ext cx="1370967" cy="324678"/>
           </a:xfrm>
           <a:prstGeom prst="foldedCorner">

</xml_diff>